<commit_message>
Update feedback from Julius
</commit_message>
<xml_diff>
--- a/Presentation.pptx
+++ b/Presentation.pptx
@@ -3956,7 +3956,7 @@
         <a:lstStyle/>
         <a:p>
           <a:r>
-            <a:rPr lang="en-US" sz="2200"/>
+            <a:rPr lang="en-US" sz="2200" dirty="0"/>
             <a:t>View, User Action Handler</a:t>
           </a:r>
         </a:p>
@@ -4038,14 +4038,6 @@
           <a:r>
             <a:rPr lang="en-US" sz="2200" dirty="0"/>
             <a:t> Handler, </a:t>
-          </a:r>
-          <a:r>
-            <a:rPr lang="en-US" sz="2200" dirty="0" err="1"/>
-            <a:t>ViewModel</a:t>
-          </a:r>
-          <a:r>
-            <a:rPr lang="en-US" sz="2200" dirty="0"/>
-            <a:t>, </a:t>
           </a:r>
           <a:r>
             <a:rPr lang="en-US" sz="2200" dirty="0" err="1"/>
@@ -5890,14 +5882,6 @@
           </a:r>
           <a:r>
             <a:rPr lang="en-US" sz="2200" kern="1200" dirty="0" err="1"/>
-            <a:t>ViewModel</a:t>
-          </a:r>
-          <a:r>
-            <a:rPr lang="en-US" sz="2200" kern="1200" dirty="0"/>
-            <a:t>, </a:t>
-          </a:r>
-          <a:r>
-            <a:rPr lang="en-US" sz="2200" kern="1200" dirty="0" err="1"/>
             <a:t>etc</a:t>
           </a:r>
           <a:endParaRPr lang="en-US" sz="2200" kern="1200" dirty="0"/>
@@ -6089,7 +6073,7 @@
             <a:buNone/>
           </a:pPr>
           <a:r>
-            <a:rPr lang="en-US" sz="2200" kern="1200"/>
+            <a:rPr lang="en-US" sz="2200" kern="1200" dirty="0"/>
             <a:t>View, User Action Handler</a:t>
           </a:r>
         </a:p>
@@ -10931,7 +10915,7 @@
           <a:p>
             <a:fld id="{72D9CB7B-650F-8246-A3D9-0A62D3A19714}" type="datetimeFigureOut">
               <a:rPr lang="en-US" smtClean="0"/>
-              <a:t>9/23/18</a:t>
+              <a:t>9/27/18</a:t>
             </a:fld>
             <a:endParaRPr lang="en-US"/>
           </a:p>
@@ -12482,6 +12466,65 @@
               <a:tabLst/>
               <a:defRPr/>
             </a:pPr>
+            <a:endParaRPr lang="en-US" sz="1200" b="0" i="0" kern="1200" dirty="0">
+              <a:solidFill>
+                <a:schemeClr val="tx1"/>
+              </a:solidFill>
+              <a:effectLst/>
+              <a:latin typeface="+mn-lt"/>
+              <a:ea typeface="+mn-ea"/>
+              <a:cs typeface="+mn-cs"/>
+            </a:endParaRPr>
+          </a:p>
+          <a:p>
+            <a:pPr marL="0" marR="0" lvl="0" indent="0" algn="l" defTabSz="914400" rtl="0" eaLnBrk="1" fontAlgn="auto" latinLnBrk="0" hangingPunct="1">
+              <a:lnSpc>
+                <a:spcPct val="100000"/>
+              </a:lnSpc>
+              <a:spcBef>
+                <a:spcPts val="0"/>
+              </a:spcBef>
+              <a:spcAft>
+                <a:spcPts val="0"/>
+              </a:spcAft>
+              <a:buClrTx/>
+              <a:buSzTx/>
+              <a:buFontTx/>
+              <a:buNone/>
+              <a:tabLst/>
+              <a:defRPr/>
+            </a:pPr>
+            <a:r>
+              <a:rPr lang="en-US" sz="1200" b="0" i="0" kern="1200" dirty="0">
+                <a:solidFill>
+                  <a:schemeClr val="tx1"/>
+                </a:solidFill>
+                <a:effectLst/>
+                <a:latin typeface="+mn-lt"/>
+                <a:ea typeface="+mn-ea"/>
+                <a:cs typeface="+mn-cs"/>
+              </a:rPr>
+              <a:t>Put the line below to my suggestions</a:t>
+            </a:r>
+          </a:p>
+          <a:p>
+            <a:pPr marL="0" marR="0" lvl="0" indent="0" algn="l" defTabSz="914400" rtl="0" eaLnBrk="1" fontAlgn="auto" latinLnBrk="0" hangingPunct="1">
+              <a:lnSpc>
+                <a:spcPct val="100000"/>
+              </a:lnSpc>
+              <a:spcBef>
+                <a:spcPts val="0"/>
+              </a:spcBef>
+              <a:spcAft>
+                <a:spcPts val="0"/>
+              </a:spcAft>
+              <a:buClrTx/>
+              <a:buSzTx/>
+              <a:buFontTx/>
+              <a:buNone/>
+              <a:tabLst/>
+              <a:defRPr/>
+            </a:pPr>
             <a:r>
               <a:rPr lang="en-US" sz="1200" b="0" i="0" kern="1200" dirty="0">
                 <a:solidFill>
@@ -12548,6 +12591,93 @@
                 <a:cs typeface="+mn-cs"/>
               </a:rPr>
               <a:t> and beside that you need to rewrite lots of tests for both.</a:t>
+            </a:r>
+          </a:p>
+          <a:p>
+            <a:pPr marL="171450" marR="0" lvl="0" indent="-171450" algn="l" defTabSz="914400" rtl="0" eaLnBrk="1" fontAlgn="auto" latinLnBrk="0" hangingPunct="1">
+              <a:lnSpc>
+                <a:spcPct val="100000"/>
+              </a:lnSpc>
+              <a:spcBef>
+                <a:spcPts val="0"/>
+              </a:spcBef>
+              <a:spcAft>
+                <a:spcPts val="0"/>
+              </a:spcAft>
+              <a:buClrTx/>
+              <a:buSzTx/>
+              <a:buFontTx/>
+              <a:buChar char="-"/>
+              <a:tabLst/>
+              <a:defRPr/>
+            </a:pPr>
+            <a:endParaRPr lang="en-US" sz="1200" b="0" i="0" kern="1200" dirty="0">
+              <a:solidFill>
+                <a:schemeClr val="tx1"/>
+              </a:solidFill>
+              <a:effectLst/>
+              <a:latin typeface="+mn-lt"/>
+              <a:ea typeface="+mn-ea"/>
+              <a:cs typeface="+mn-cs"/>
+            </a:endParaRPr>
+          </a:p>
+          <a:p>
+            <a:pPr marL="171450" marR="0" lvl="0" indent="-171450" algn="l" defTabSz="914400" rtl="0" eaLnBrk="1" fontAlgn="auto" latinLnBrk="0" hangingPunct="1">
+              <a:lnSpc>
+                <a:spcPct val="100000"/>
+              </a:lnSpc>
+              <a:spcBef>
+                <a:spcPts val="0"/>
+              </a:spcBef>
+              <a:spcAft>
+                <a:spcPts val="0"/>
+              </a:spcAft>
+              <a:buClrTx/>
+              <a:buSzTx/>
+              <a:buFontTx/>
+              <a:buChar char="-"/>
+              <a:tabLst/>
+              <a:defRPr/>
+            </a:pPr>
+            <a:endParaRPr lang="en-US" sz="1200" b="0" i="0" kern="1200" dirty="0">
+              <a:solidFill>
+                <a:schemeClr val="tx1"/>
+              </a:solidFill>
+              <a:effectLst/>
+              <a:latin typeface="+mn-lt"/>
+              <a:ea typeface="+mn-ea"/>
+              <a:cs typeface="+mn-cs"/>
+            </a:endParaRPr>
+          </a:p>
+          <a:p>
+            <a:pPr marL="171450" marR="0" lvl="0" indent="-171450" algn="l" defTabSz="914400" rtl="0" eaLnBrk="1" fontAlgn="auto" latinLnBrk="0" hangingPunct="1">
+              <a:lnSpc>
+                <a:spcPct val="100000"/>
+              </a:lnSpc>
+              <a:spcBef>
+                <a:spcPts val="0"/>
+              </a:spcBef>
+              <a:spcAft>
+                <a:spcPts val="0"/>
+              </a:spcAft>
+              <a:buClrTx/>
+              <a:buSzTx/>
+              <a:buFontTx/>
+              <a:buChar char="-"/>
+              <a:tabLst/>
+              <a:defRPr/>
+            </a:pPr>
+            <a:r>
+              <a:rPr lang="en-US" sz="1200" b="0" i="0" kern="1200" dirty="0">
+                <a:solidFill>
+                  <a:schemeClr val="tx1"/>
+                </a:solidFill>
+                <a:effectLst/>
+                <a:latin typeface="+mn-lt"/>
+                <a:ea typeface="+mn-ea"/>
+                <a:cs typeface="+mn-cs"/>
+              </a:rPr>
+              <a:t>On Viki we also write both and we learn from the reality.</a:t>
             </a:r>
           </a:p>
         </p:txBody>
@@ -14468,6 +14598,90 @@
           <a:bodyPr/>
           <a:lstStyle/>
           <a:p>
+            <a:endParaRPr lang="en-US" dirty="0"/>
+          </a:p>
+        </p:txBody>
+      </p:sp>
+      <p:sp>
+        <p:nvSpPr>
+          <p:cNvPr id="4" name="Slide Number Placeholder 3"/>
+          <p:cNvSpPr>
+            <a:spLocks noGrp="1"/>
+          </p:cNvSpPr>
+          <p:nvPr>
+            <p:ph type="sldNum" sz="quarter" idx="10"/>
+          </p:nvPr>
+        </p:nvSpPr>
+        <p:spPr/>
+        <p:txBody>
+          <a:bodyPr/>
+          <a:lstStyle/>
+          <a:p>
+            <a:fld id="{021361DD-1E38-BB4A-B605-BA873CC7A43C}" type="slidenum">
+              <a:rPr lang="en-US" smtClean="0"/>
+              <a:t>23</a:t>
+            </a:fld>
+            <a:endParaRPr lang="en-US"/>
+          </a:p>
+        </p:txBody>
+      </p:sp>
+    </p:spTree>
+    <p:extLst>
+      <p:ext uri="{BB962C8B-B14F-4D97-AF65-F5344CB8AC3E}">
+        <p14:creationId xmlns:p14="http://schemas.microsoft.com/office/powerpoint/2010/main" val="82419539"/>
+      </p:ext>
+    </p:extLst>
+  </p:cSld>
+  <p:clrMapOvr>
+    <a:masterClrMapping/>
+  </p:clrMapOvr>
+</p:notes>
+</file>
+
+<file path=ppt/notesSlides/notesSlide21.xml><?xml version="1.0" encoding="utf-8"?>
+<p:notes xmlns:a="http://schemas.openxmlformats.org/drawingml/2006/main" xmlns:r="http://schemas.openxmlformats.org/officeDocument/2006/relationships" xmlns:p="http://schemas.openxmlformats.org/presentationml/2006/main">
+  <p:cSld>
+    <p:spTree>
+      <p:nvGrpSpPr>
+        <p:cNvPr id="1" name=""/>
+        <p:cNvGrpSpPr/>
+        <p:nvPr/>
+      </p:nvGrpSpPr>
+      <p:grpSpPr>
+        <a:xfrm>
+          <a:off x="0" y="0"/>
+          <a:ext cx="0" cy="0"/>
+          <a:chOff x="0" y="0"/>
+          <a:chExt cx="0" cy="0"/>
+        </a:xfrm>
+      </p:grpSpPr>
+      <p:sp>
+        <p:nvSpPr>
+          <p:cNvPr id="2" name="Slide Image Placeholder 1"/>
+          <p:cNvSpPr>
+            <a:spLocks noGrp="1" noRot="1" noChangeAspect="1"/>
+          </p:cNvSpPr>
+          <p:nvPr>
+            <p:ph type="sldImg"/>
+          </p:nvPr>
+        </p:nvSpPr>
+        <p:spPr/>
+      </p:sp>
+      <p:sp>
+        <p:nvSpPr>
+          <p:cNvPr id="3" name="Notes Placeholder 2"/>
+          <p:cNvSpPr>
+            <a:spLocks noGrp="1"/>
+          </p:cNvSpPr>
+          <p:nvPr>
+            <p:ph type="body" idx="1"/>
+          </p:nvPr>
+        </p:nvSpPr>
+        <p:spPr/>
+        <p:txBody>
+          <a:bodyPr/>
+          <a:lstStyle/>
+          <a:p>
             <a:pPr marL="0" marR="0" lvl="0" indent="0" algn="l" defTabSz="914400" rtl="0" eaLnBrk="1" fontAlgn="auto" latinLnBrk="0" hangingPunct="1">
               <a:lnSpc>
                 <a:spcPct val="100000"/>
@@ -14587,7 +14801,7 @@
 </p:notes>
 </file>
 
-<file path=ppt/notesSlides/notesSlide21.xml><?xml version="1.0" encoding="utf-8"?>
+<file path=ppt/notesSlides/notesSlide22.xml><?xml version="1.0" encoding="utf-8"?>
 <p:notes xmlns:a="http://schemas.openxmlformats.org/drawingml/2006/main" xmlns:r="http://schemas.openxmlformats.org/officeDocument/2006/relationships" xmlns:p="http://schemas.openxmlformats.org/presentationml/2006/main">
   <p:cSld>
     <p:spTree>
@@ -14989,6 +15203,58 @@
             <a:r>
               <a:rPr lang="en-US" dirty="0"/>
               <a:t> and how to implement it on scratch or in an iOS application which is already built and already working</a:t>
+            </a:r>
+          </a:p>
+          <a:p>
+            <a:pPr marL="171450" indent="-171450">
+              <a:buFontTx/>
+              <a:buChar char="-"/>
+            </a:pPr>
+            <a:endParaRPr lang="en-US" dirty="0"/>
+          </a:p>
+          <a:p>
+            <a:pPr marL="171450" indent="-171450">
+              <a:buFontTx/>
+              <a:buChar char="-"/>
+            </a:pPr>
+            <a:r>
+              <a:rPr lang="en-US" dirty="0"/>
+              <a:t>We thought there would be only </a:t>
+            </a:r>
+            <a:r>
+              <a:rPr lang="en-US" dirty="0" err="1"/>
+              <a:t>tv</a:t>
+            </a:r>
+            <a:r>
+              <a:rPr lang="en-US" dirty="0"/>
+              <a:t> app on Apple TV but actually there are more than that. There are some other ideas like comic, weather, plane finder</a:t>
+            </a:r>
+          </a:p>
+          <a:p>
+            <a:pPr marL="171450" indent="-171450">
+              <a:buFontTx/>
+              <a:buChar char="-"/>
+            </a:pPr>
+            <a:endParaRPr lang="en-US" dirty="0"/>
+          </a:p>
+          <a:p>
+            <a:pPr marL="171450" indent="-171450">
+              <a:buFontTx/>
+              <a:buChar char="-"/>
+            </a:pPr>
+            <a:r>
+              <a:rPr lang="en-US" dirty="0"/>
+              <a:t>There are not many apps so far on Apple TV so if you implement it you can be a featured partner with Apple </a:t>
+            </a:r>
+          </a:p>
+          <a:p>
+            <a:pPr marL="171450" indent="-171450">
+              <a:buFontTx/>
+              <a:buChar char="-"/>
+            </a:pPr>
+            <a:r>
+              <a:rPr lang="en-US" dirty="0"/>
+              <a:t>Also it is a way to make the commitment with user.</a:t>
             </a:r>
           </a:p>
           <a:p>
@@ -16288,7 +16554,7 @@
           <a:p>
             <a:fld id="{48A87A34-81AB-432B-8DAE-1953F412C126}" type="datetimeFigureOut">
               <a:rPr lang="en-US" smtClean="0"/>
-              <a:t>9/23/18</a:t>
+              <a:t>9/27/18</a:t>
             </a:fld>
             <a:endParaRPr lang="en-US" dirty="0"/>
           </a:p>
@@ -16619,7 +16885,7 @@
             <a:fld id="{48A87A34-81AB-432B-8DAE-1953F412C126}" type="datetimeFigureOut">
               <a:rPr lang="en-US" smtClean="0"/>
               <a:pPr/>
-              <a:t>9/23/18</a:t>
+              <a:t>9/27/18</a:t>
             </a:fld>
             <a:endParaRPr lang="en-US" dirty="0"/>
           </a:p>
@@ -16801,7 +17067,7 @@
             <a:fld id="{48A87A34-81AB-432B-8DAE-1953F412C126}" type="datetimeFigureOut">
               <a:rPr lang="en-US" smtClean="0"/>
               <a:pPr/>
-              <a:t>9/23/18</a:t>
+              <a:t>9/27/18</a:t>
             </a:fld>
             <a:endParaRPr lang="en-US" dirty="0"/>
           </a:p>
@@ -16973,7 +17239,7 @@
             <a:fld id="{48A87A34-81AB-432B-8DAE-1953F412C126}" type="datetimeFigureOut">
               <a:rPr lang="en-US" smtClean="0"/>
               <a:pPr/>
-              <a:t>9/23/18</a:t>
+              <a:t>9/27/18</a:t>
             </a:fld>
             <a:endParaRPr lang="en-US" dirty="0"/>
           </a:p>
@@ -17251,7 +17517,7 @@
           <a:p>
             <a:fld id="{48A87A34-81AB-432B-8DAE-1953F412C126}" type="datetimeFigureOut">
               <a:rPr lang="en-US" smtClean="0"/>
-              <a:t>9/23/18</a:t>
+              <a:t>9/27/18</a:t>
             </a:fld>
             <a:endParaRPr lang="en-US" dirty="0"/>
           </a:p>
@@ -17646,7 +17912,7 @@
             <a:fld id="{48A87A34-81AB-432B-8DAE-1953F412C126}" type="datetimeFigureOut">
               <a:rPr lang="en-US" smtClean="0"/>
               <a:pPr/>
-              <a:t>9/23/18</a:t>
+              <a:t>9/27/18</a:t>
             </a:fld>
             <a:endParaRPr lang="en-US" dirty="0"/>
           </a:p>
@@ -18125,7 +18391,7 @@
             <a:fld id="{48A87A34-81AB-432B-8DAE-1953F412C126}" type="datetimeFigureOut">
               <a:rPr lang="en-US" smtClean="0"/>
               <a:pPr/>
-              <a:t>9/23/18</a:t>
+              <a:t>9/27/18</a:t>
             </a:fld>
             <a:endParaRPr lang="en-US" dirty="0"/>
           </a:p>
@@ -18244,7 +18510,7 @@
           <a:p>
             <a:fld id="{48A87A34-81AB-432B-8DAE-1953F412C126}" type="datetimeFigureOut">
               <a:rPr lang="en-US" smtClean="0"/>
-              <a:t>9/23/18</a:t>
+              <a:t>9/27/18</a:t>
             </a:fld>
             <a:endParaRPr lang="en-US" dirty="0"/>
           </a:p>
@@ -18339,7 +18605,7 @@
           <a:p>
             <a:fld id="{48A87A34-81AB-432B-8DAE-1953F412C126}" type="datetimeFigureOut">
               <a:rPr lang="en-US" smtClean="0"/>
-              <a:t>9/23/18</a:t>
+              <a:t>9/27/18</a:t>
             </a:fld>
             <a:endParaRPr lang="en-US" dirty="0"/>
           </a:p>
@@ -18686,7 +18952,7 @@
             <a:fld id="{48A87A34-81AB-432B-8DAE-1953F412C126}" type="datetimeFigureOut">
               <a:rPr lang="en-US" smtClean="0"/>
               <a:pPr/>
-              <a:t>9/23/18</a:t>
+              <a:t>9/27/18</a:t>
             </a:fld>
             <a:endParaRPr lang="en-US" dirty="0"/>
           </a:p>
@@ -19076,7 +19342,7 @@
             <a:fld id="{48A87A34-81AB-432B-8DAE-1953F412C126}" type="datetimeFigureOut">
               <a:rPr lang="en-US" smtClean="0"/>
               <a:pPr/>
-              <a:t>9/23/18</a:t>
+              <a:t>9/27/18</a:t>
             </a:fld>
             <a:endParaRPr lang="en-US" dirty="0"/>
           </a:p>
@@ -19355,7 +19621,7 @@
             <a:fld id="{48A87A34-81AB-432B-8DAE-1953F412C126}" type="datetimeFigureOut">
               <a:rPr lang="en-US" smtClean="0"/>
               <a:pPr/>
-              <a:t>9/23/18</a:t>
+              <a:t>9/27/18</a:t>
             </a:fld>
             <a:endParaRPr lang="en-US" dirty="0"/>
           </a:p>
@@ -22875,7 +23141,7 @@
             <p:ph idx="1"/>
             <p:extLst>
               <p:ext uri="{D42A27DB-BD31-4B8C-83A1-F6EECF244321}">
-                <p14:modId xmlns:p14="http://schemas.microsoft.com/office/powerpoint/2010/main" val="817803443"/>
+                <p14:modId xmlns:p14="http://schemas.microsoft.com/office/powerpoint/2010/main" val="1116590519"/>
               </p:ext>
             </p:extLst>
           </p:nvPr>
@@ -23916,7 +24182,7 @@
           <a:p>
             <a:r>
               <a:rPr lang="en-US" sz="8800" cap="all" dirty="0"/>
-              <a:t>Notes</a:t>
+              <a:t>conclusion</a:t>
             </a:r>
           </a:p>
         </p:txBody>

</xml_diff>